<commit_message>
Updates to readme and ppt
</commit_message>
<xml_diff>
--- a/Breast Cancer Prediction .pptx
+++ b/Breast Cancer Prediction .pptx
@@ -1010,7 +1010,7 @@
       </p:grpSpPr>
       <p:sp>
         <p:nvSpPr>
-          <p:cNvPr id="69" name="Google Shape;69;gd890966b99_0_13:notes"/>
+          <p:cNvPr id="69" name="Google Shape;69;gd639e82c59_0_0:notes"/>
           <p:cNvSpPr/>
           <p:nvPr>
             <p:ph idx="2" type="sldImg"/>
@@ -1045,7 +1045,7 @@
       </p:sp>
       <p:sp>
         <p:nvSpPr>
-          <p:cNvPr id="70" name="Google Shape;70;gd890966b99_0_13:notes"/>
+          <p:cNvPr id="70" name="Google Shape;70;gd639e82c59_0_0:notes"/>
           <p:cNvSpPr txBox="1"/>
           <p:nvPr>
             <p:ph idx="1" type="body"/>
@@ -1095,7 +1095,7 @@
   <p:cSld>
     <p:spTree>
       <p:nvGrpSpPr>
-        <p:cNvPr id="74" name="Shape 74"/>
+        <p:cNvPr id="75" name="Shape 75"/>
         <p:cNvGrpSpPr/>
         <p:nvPr/>
       </p:nvGrpSpPr>
@@ -1109,7 +1109,7 @@
       </p:grpSpPr>
       <p:sp>
         <p:nvSpPr>
-          <p:cNvPr id="75" name="Google Shape;75;gd639e82c59_0_0:notes"/>
+          <p:cNvPr id="76" name="Google Shape;76;gd639e82c59_0_6:notes"/>
           <p:cNvSpPr/>
           <p:nvPr>
             <p:ph idx="2" type="sldImg"/>
@@ -1144,7 +1144,7 @@
       </p:sp>
       <p:sp>
         <p:nvSpPr>
-          <p:cNvPr id="76" name="Google Shape;76;gd639e82c59_0_0:notes"/>
+          <p:cNvPr id="77" name="Google Shape;77;gd639e82c59_0_6:notes"/>
           <p:cNvSpPr txBox="1"/>
           <p:nvPr>
             <p:ph idx="1" type="body"/>
@@ -1194,7 +1194,7 @@
   <p:cSld>
     <p:spTree>
       <p:nvGrpSpPr>
-        <p:cNvPr id="81" name="Shape 81"/>
+        <p:cNvPr id="83" name="Shape 83"/>
         <p:cNvGrpSpPr/>
         <p:nvPr/>
       </p:nvGrpSpPr>
@@ -1208,7 +1208,7 @@
       </p:grpSpPr>
       <p:sp>
         <p:nvSpPr>
-          <p:cNvPr id="82" name="Google Shape;82;gd639e82c59_0_6:notes"/>
+          <p:cNvPr id="84" name="Google Shape;84;gd890966b99_0_13:notes"/>
           <p:cNvSpPr/>
           <p:nvPr>
             <p:ph idx="2" type="sldImg"/>
@@ -1243,7 +1243,7 @@
       </p:sp>
       <p:sp>
         <p:nvSpPr>
-          <p:cNvPr id="83" name="Google Shape;83;gd639e82c59_0_6:notes"/>
+          <p:cNvPr id="85" name="Google Shape;85;gd890966b99_0_13:notes"/>
           <p:cNvSpPr txBox="1"/>
           <p:nvPr>
             <p:ph idx="1" type="body"/>
@@ -1491,7 +1491,7 @@
   <p:cSld>
     <p:spTree>
       <p:nvGrpSpPr>
-        <p:cNvPr id="101" name="Shape 101"/>
+        <p:cNvPr id="102" name="Shape 102"/>
         <p:cNvGrpSpPr/>
         <p:nvPr/>
       </p:nvGrpSpPr>
@@ -1505,7 +1505,7 @@
       </p:grpSpPr>
       <p:sp>
         <p:nvSpPr>
-          <p:cNvPr id="102" name="Google Shape;102;gd890966b99_0_38:notes"/>
+          <p:cNvPr id="103" name="Google Shape;103;gd890966b99_0_38:notes"/>
           <p:cNvSpPr/>
           <p:nvPr>
             <p:ph idx="2" type="sldImg"/>
@@ -1540,7 +1540,7 @@
       </p:sp>
       <p:sp>
         <p:nvSpPr>
-          <p:cNvPr id="103" name="Google Shape;103;gd890966b99_0_38:notes"/>
+          <p:cNvPr id="104" name="Google Shape;104;gd890966b99_0_38:notes"/>
           <p:cNvSpPr txBox="1"/>
           <p:nvPr>
             <p:ph idx="1" type="body"/>
@@ -6331,7 +6331,7 @@
         </p:spPr>
         <p:txBody>
           <a:bodyPr anchorCtr="0" anchor="t" bIns="91425" lIns="91425" spcFirstLastPara="1" rIns="91425" wrap="square" tIns="91425">
-            <a:normAutofit/>
+            <a:normAutofit fontScale="85000" lnSpcReduction="20000"/>
           </a:bodyPr>
           <a:lstStyle/>
           <a:p>
@@ -6347,10 +6347,18 @@
             <a:r>
               <a:rPr lang="en">
                 <a:solidFill>
+                  <a:schemeClr val="dk1"/>
+                </a:solidFill>
+              </a:rPr>
+              <a:t>Tanay Ganeriwal, </a:t>
+            </a:r>
+            <a:r>
+              <a:rPr lang="en">
+                <a:solidFill>
                   <a:srgbClr val="000000"/>
                 </a:solidFill>
               </a:rPr>
-              <a:t>Bharath, Premchand, Tanay, Tejas</a:t>
+              <a:t>Bharath Jagini, Premchand Jayachandran, Tejas Mahajan</a:t>
             </a:r>
             <a:endParaRPr>
               <a:solidFill>
@@ -7216,462 +7224,6 @@
                   <a:srgbClr val="FF0000"/>
                 </a:solidFill>
               </a:rPr>
-              <a:t>Data Preprocessing and feature selection</a:t>
-            </a:r>
-            <a:endParaRPr>
-              <a:solidFill>
-                <a:srgbClr val="FF0000"/>
-              </a:solidFill>
-            </a:endParaRPr>
-          </a:p>
-        </p:txBody>
-      </p:sp>
-      <p:sp>
-        <p:nvSpPr>
-          <p:cNvPr id="73" name="Google Shape;73;p16"/>
-          <p:cNvSpPr txBox="1"/>
-          <p:nvPr>
-            <p:ph idx="1" type="body"/>
-          </p:nvPr>
-        </p:nvSpPr>
-        <p:spPr>
-          <a:xfrm>
-            <a:off x="311700" y="1152475"/>
-            <a:ext cx="8520600" cy="3591900"/>
-          </a:xfrm>
-          <a:prstGeom prst="rect">
-            <a:avLst/>
-          </a:prstGeom>
-        </p:spPr>
-        <p:txBody>
-          <a:bodyPr anchorCtr="0" anchor="t" bIns="91425" lIns="91425" spcFirstLastPara="1" rIns="91425" wrap="square" tIns="91425">
-            <a:noAutofit/>
-          </a:bodyPr>
-          <a:lstStyle/>
-          <a:p>
-            <a:pPr indent="-323850" lvl="0" marL="457200" rtl="0" algn="l">
-              <a:lnSpc>
-                <a:spcPct val="95000"/>
-              </a:lnSpc>
-              <a:spcBef>
-                <a:spcPts val="0"/>
-              </a:spcBef>
-              <a:spcAft>
-                <a:spcPts val="0"/>
-              </a:spcAft>
-              <a:buClr>
-                <a:srgbClr val="000000"/>
-              </a:buClr>
-              <a:buSzPts val="1500"/>
-              <a:buChar char="●"/>
-            </a:pPr>
-            <a:r>
-              <a:rPr lang="en" sz="1500">
-                <a:solidFill>
-                  <a:srgbClr val="000000"/>
-                </a:solidFill>
-              </a:rPr>
-              <a:t>The feature which has no </a:t>
-            </a:r>
-            <a:r>
-              <a:rPr lang="en" sz="1500">
-                <a:solidFill>
-                  <a:srgbClr val="000000"/>
-                </a:solidFill>
-              </a:rPr>
-              <a:t>relevant</a:t>
-            </a:r>
-            <a:r>
-              <a:rPr lang="en" sz="1500">
-                <a:solidFill>
-                  <a:srgbClr val="000000"/>
-                </a:solidFill>
-              </a:rPr>
-              <a:t> data is dropped.</a:t>
-            </a:r>
-            <a:endParaRPr sz="1500">
-              <a:solidFill>
-                <a:srgbClr val="000000"/>
-              </a:solidFill>
-            </a:endParaRPr>
-          </a:p>
-          <a:p>
-            <a:pPr indent="-323850" lvl="0" marL="457200" rtl="0" algn="l">
-              <a:lnSpc>
-                <a:spcPct val="95000"/>
-              </a:lnSpc>
-              <a:spcBef>
-                <a:spcPts val="0"/>
-              </a:spcBef>
-              <a:spcAft>
-                <a:spcPts val="0"/>
-              </a:spcAft>
-              <a:buClr>
-                <a:srgbClr val="000000"/>
-              </a:buClr>
-              <a:buSzPts val="1500"/>
-              <a:buChar char="●"/>
-            </a:pPr>
-            <a:r>
-              <a:rPr lang="en" sz="1500">
-                <a:solidFill>
-                  <a:srgbClr val="000000"/>
-                </a:solidFill>
-              </a:rPr>
-              <a:t>The target values are converted to 0 and 1.</a:t>
-            </a:r>
-            <a:endParaRPr sz="1500">
-              <a:solidFill>
-                <a:srgbClr val="000000"/>
-              </a:solidFill>
-            </a:endParaRPr>
-          </a:p>
-          <a:p>
-            <a:pPr indent="-323850" lvl="0" marL="457200" rtl="0" algn="l">
-              <a:lnSpc>
-                <a:spcPct val="95000"/>
-              </a:lnSpc>
-              <a:spcBef>
-                <a:spcPts val="0"/>
-              </a:spcBef>
-              <a:spcAft>
-                <a:spcPts val="0"/>
-              </a:spcAft>
-              <a:buClr>
-                <a:srgbClr val="000000"/>
-              </a:buClr>
-              <a:buSzPts val="1500"/>
-              <a:buChar char="●"/>
-            </a:pPr>
-            <a:r>
-              <a:rPr lang="en" sz="1500">
-                <a:solidFill>
-                  <a:srgbClr val="000000"/>
-                </a:solidFill>
-              </a:rPr>
-              <a:t>Dataframe is checked for null values.</a:t>
-            </a:r>
-            <a:endParaRPr sz="1500">
-              <a:solidFill>
-                <a:srgbClr val="000000"/>
-              </a:solidFill>
-            </a:endParaRPr>
-          </a:p>
-          <a:p>
-            <a:pPr indent="0" lvl="0" marL="0" rtl="0" algn="l">
-              <a:lnSpc>
-                <a:spcPct val="95000"/>
-              </a:lnSpc>
-              <a:spcBef>
-                <a:spcPts val="1200"/>
-              </a:spcBef>
-              <a:spcAft>
-                <a:spcPts val="0"/>
-              </a:spcAft>
-              <a:buNone/>
-            </a:pPr>
-            <a:r>
-              <a:rPr lang="en" sz="1500">
-                <a:solidFill>
-                  <a:srgbClr val="000000"/>
-                </a:solidFill>
-              </a:rPr>
-              <a:t>	Different </a:t>
-            </a:r>
-            <a:r>
-              <a:rPr lang="en" sz="1500">
-                <a:solidFill>
-                  <a:srgbClr val="000000"/>
-                </a:solidFill>
-              </a:rPr>
-              <a:t>options</a:t>
-            </a:r>
-            <a:r>
-              <a:rPr lang="en" sz="1500">
-                <a:solidFill>
-                  <a:srgbClr val="000000"/>
-                </a:solidFill>
-              </a:rPr>
-              <a:t> are tried in terms feature selection and data preprocessing like</a:t>
-            </a:r>
-            <a:endParaRPr sz="1500">
-              <a:solidFill>
-                <a:srgbClr val="000000"/>
-              </a:solidFill>
-            </a:endParaRPr>
-          </a:p>
-          <a:p>
-            <a:pPr indent="-323850" lvl="0" marL="457200" rtl="0" algn="l">
-              <a:lnSpc>
-                <a:spcPct val="95000"/>
-              </a:lnSpc>
-              <a:spcBef>
-                <a:spcPts val="1200"/>
-              </a:spcBef>
-              <a:spcAft>
-                <a:spcPts val="0"/>
-              </a:spcAft>
-              <a:buClr>
-                <a:srgbClr val="000000"/>
-              </a:buClr>
-              <a:buSzPts val="1500"/>
-              <a:buChar char="●"/>
-            </a:pPr>
-            <a:r>
-              <a:rPr lang="en" sz="1500">
-                <a:solidFill>
-                  <a:srgbClr val="000000"/>
-                </a:solidFill>
-              </a:rPr>
-              <a:t>Selecting</a:t>
-            </a:r>
-            <a:r>
-              <a:rPr lang="en" sz="1500">
-                <a:solidFill>
-                  <a:srgbClr val="000000"/>
-                </a:solidFill>
-              </a:rPr>
-              <a:t> K best features.</a:t>
-            </a:r>
-            <a:endParaRPr sz="1500">
-              <a:solidFill>
-                <a:srgbClr val="000000"/>
-              </a:solidFill>
-            </a:endParaRPr>
-          </a:p>
-          <a:p>
-            <a:pPr indent="-323850" lvl="0" marL="457200" rtl="0" algn="l">
-              <a:lnSpc>
-                <a:spcPct val="95000"/>
-              </a:lnSpc>
-              <a:spcBef>
-                <a:spcPts val="0"/>
-              </a:spcBef>
-              <a:spcAft>
-                <a:spcPts val="0"/>
-              </a:spcAft>
-              <a:buClr>
-                <a:srgbClr val="000000"/>
-              </a:buClr>
-              <a:buSzPts val="1500"/>
-              <a:buChar char="●"/>
-            </a:pPr>
-            <a:r>
-              <a:rPr lang="en" sz="1500">
-                <a:solidFill>
-                  <a:srgbClr val="000000"/>
-                </a:solidFill>
-              </a:rPr>
-              <a:t>PCA</a:t>
-            </a:r>
-            <a:endParaRPr sz="1500">
-              <a:solidFill>
-                <a:srgbClr val="000000"/>
-              </a:solidFill>
-            </a:endParaRPr>
-          </a:p>
-          <a:p>
-            <a:pPr indent="-323850" lvl="0" marL="457200" rtl="0" algn="l">
-              <a:lnSpc>
-                <a:spcPct val="95000"/>
-              </a:lnSpc>
-              <a:spcBef>
-                <a:spcPts val="0"/>
-              </a:spcBef>
-              <a:spcAft>
-                <a:spcPts val="0"/>
-              </a:spcAft>
-              <a:buClr>
-                <a:srgbClr val="000000"/>
-              </a:buClr>
-              <a:buSzPts val="1500"/>
-              <a:buChar char="●"/>
-            </a:pPr>
-            <a:r>
-              <a:rPr lang="en" sz="1500">
-                <a:solidFill>
-                  <a:srgbClr val="000000"/>
-                </a:solidFill>
-              </a:rPr>
-              <a:t>Selecting the top features based correlation to the target</a:t>
-            </a:r>
-            <a:endParaRPr sz="1500">
-              <a:solidFill>
-                <a:srgbClr val="000000"/>
-              </a:solidFill>
-            </a:endParaRPr>
-          </a:p>
-          <a:p>
-            <a:pPr indent="-323850" lvl="0" marL="457200" rtl="0" algn="l">
-              <a:lnSpc>
-                <a:spcPct val="95000"/>
-              </a:lnSpc>
-              <a:spcBef>
-                <a:spcPts val="0"/>
-              </a:spcBef>
-              <a:spcAft>
-                <a:spcPts val="0"/>
-              </a:spcAft>
-              <a:buClr>
-                <a:srgbClr val="000000"/>
-              </a:buClr>
-              <a:buSzPts val="1500"/>
-              <a:buChar char="●"/>
-            </a:pPr>
-            <a:r>
-              <a:rPr lang="en" sz="1500">
-                <a:solidFill>
-                  <a:srgbClr val="000000"/>
-                </a:solidFill>
-              </a:rPr>
-              <a:t>Removing the skewness using log function.</a:t>
-            </a:r>
-            <a:endParaRPr sz="1500">
-              <a:solidFill>
-                <a:srgbClr val="000000"/>
-              </a:solidFill>
-            </a:endParaRPr>
-          </a:p>
-          <a:p>
-            <a:pPr indent="0" lvl="0" marL="0" rtl="0" algn="l">
-              <a:lnSpc>
-                <a:spcPct val="95000"/>
-              </a:lnSpc>
-              <a:spcBef>
-                <a:spcPts val="1200"/>
-              </a:spcBef>
-              <a:spcAft>
-                <a:spcPts val="1200"/>
-              </a:spcAft>
-              <a:buNone/>
-            </a:pPr>
-            <a:r>
-              <a:rPr lang="en" sz="1500">
-                <a:solidFill>
-                  <a:srgbClr val="000000"/>
-                </a:solidFill>
-              </a:rPr>
-              <a:t>	The final model uses the </a:t>
-            </a:r>
-            <a:r>
-              <a:rPr lang="en" sz="1500">
-                <a:solidFill>
-                  <a:srgbClr val="000000"/>
-                </a:solidFill>
-              </a:rPr>
-              <a:t>features</a:t>
-            </a:r>
-            <a:r>
-              <a:rPr lang="en" sz="1500">
-                <a:solidFill>
-                  <a:srgbClr val="000000"/>
-                </a:solidFill>
-              </a:rPr>
-              <a:t> selected based on the </a:t>
-            </a:r>
-            <a:r>
-              <a:rPr lang="en" sz="1500">
-                <a:solidFill>
-                  <a:srgbClr val="000000"/>
-                </a:solidFill>
-              </a:rPr>
-              <a:t>correlation</a:t>
-            </a:r>
-            <a:r>
-              <a:rPr lang="en" sz="1500">
-                <a:solidFill>
-                  <a:srgbClr val="000000"/>
-                </a:solidFill>
-              </a:rPr>
-              <a:t> and the also the log function is used to remove skewness </a:t>
-            </a:r>
-            <a:r>
-              <a:rPr lang="en" sz="1500">
-                <a:solidFill>
-                  <a:srgbClr val="000000"/>
-                </a:solidFill>
-              </a:rPr>
-              <a:t>which</a:t>
-            </a:r>
-            <a:r>
-              <a:rPr lang="en" sz="1500">
-                <a:solidFill>
-                  <a:srgbClr val="000000"/>
-                </a:solidFill>
-              </a:rPr>
-              <a:t> improves the accuracy</a:t>
-            </a:r>
-            <a:endParaRPr sz="1500">
-              <a:solidFill>
-                <a:srgbClr val="000000"/>
-              </a:solidFill>
-            </a:endParaRPr>
-          </a:p>
-        </p:txBody>
-      </p:sp>
-    </p:spTree>
-  </p:cSld>
-  <p:clrMapOvr>
-    <a:masterClrMapping/>
-  </p:clrMapOvr>
-</p:sld>
-</file>
-
-<file path=ppt/slides/slide5.xml><?xml version="1.0" encoding="utf-8"?>
-<p:sld xmlns:a="http://schemas.openxmlformats.org/drawingml/2006/main" xmlns:r="http://schemas.openxmlformats.org/officeDocument/2006/relationships" xmlns:mc="http://schemas.openxmlformats.org/markup-compatibility/2006" xmlns:mv="urn:schemas-microsoft-com:mac:vml" xmlns:p="http://schemas.openxmlformats.org/presentationml/2006/main" xmlns:c="http://schemas.openxmlformats.org/drawingml/2006/chart" xmlns:dgm="http://schemas.openxmlformats.org/drawingml/2006/diagram" xmlns:o="urn:schemas-microsoft-com:office:office" xmlns:v="urn:schemas-microsoft-com:vml" xmlns:pvml="urn:schemas-microsoft-com:office:powerpoint" xmlns:com="http://schemas.openxmlformats.org/drawingml/2006/compatibility" xmlns:p14="http://schemas.microsoft.com/office/powerpoint/2010/main" xmlns:p15="http://schemas.microsoft.com/office/powerpoint/2012/main" xmlns:ahyp="http://schemas.microsoft.com/office/drawing/2018/hyperlinkcolor">
-  <p:cSld>
-    <p:spTree>
-      <p:nvGrpSpPr>
-        <p:cNvPr id="77" name="Shape 77"/>
-        <p:cNvGrpSpPr/>
-        <p:nvPr/>
-      </p:nvGrpSpPr>
-      <p:grpSpPr>
-        <a:xfrm>
-          <a:off x="0" y="0"/>
-          <a:ext cx="0" cy="0"/>
-          <a:chOff x="0" y="0"/>
-          <a:chExt cx="0" cy="0"/>
-        </a:xfrm>
-      </p:grpSpPr>
-      <p:sp>
-        <p:nvSpPr>
-          <p:cNvPr id="78" name="Google Shape;78;p17"/>
-          <p:cNvSpPr txBox="1"/>
-          <p:nvPr>
-            <p:ph type="title"/>
-          </p:nvPr>
-        </p:nvSpPr>
-        <p:spPr>
-          <a:xfrm>
-            <a:off x="311700" y="445025"/>
-            <a:ext cx="8520600" cy="572700"/>
-          </a:xfrm>
-          <a:prstGeom prst="rect">
-            <a:avLst/>
-          </a:prstGeom>
-        </p:spPr>
-        <p:txBody>
-          <a:bodyPr anchorCtr="0" anchor="t" bIns="91425" lIns="91425" spcFirstLastPara="1" rIns="91425" wrap="square" tIns="91425">
-            <a:normAutofit fontScale="90000"/>
-          </a:bodyPr>
-          <a:lstStyle/>
-          <a:p>
-            <a:pPr indent="0" lvl="0" marL="0" rtl="0" algn="l">
-              <a:spcBef>
-                <a:spcPts val="0"/>
-              </a:spcBef>
-              <a:spcAft>
-                <a:spcPts val="0"/>
-              </a:spcAft>
-              <a:buNone/>
-            </a:pPr>
-            <a:r>
-              <a:rPr lang="en">
-                <a:solidFill>
-                  <a:srgbClr val="FF0000"/>
-                </a:solidFill>
-              </a:rPr>
               <a:t>Data Visualization</a:t>
             </a:r>
             <a:endParaRPr>
@@ -7684,7 +7236,7 @@
       </p:sp>
       <p:pic>
         <p:nvPicPr>
-          <p:cNvPr id="79" name="Google Shape;79;p17"/>
+          <p:cNvPr id="73" name="Google Shape;73;p16"/>
           <p:cNvPicPr preferRelativeResize="0"/>
           <p:nvPr/>
         </p:nvPicPr>
@@ -7712,7 +7264,7 @@
       </p:pic>
       <p:sp>
         <p:nvSpPr>
-          <p:cNvPr id="80" name="Google Shape;80;p17"/>
+          <p:cNvPr id="74" name="Google Shape;74;p16"/>
           <p:cNvSpPr txBox="1"/>
           <p:nvPr>
             <p:ph idx="1" type="body"/>
@@ -7781,12 +7333,12 @@
 </p:sld>
 </file>
 
-<file path=ppt/slides/slide6.xml><?xml version="1.0" encoding="utf-8"?>
+<file path=ppt/slides/slide5.xml><?xml version="1.0" encoding="utf-8"?>
 <p:sld xmlns:a="http://schemas.openxmlformats.org/drawingml/2006/main" xmlns:r="http://schemas.openxmlformats.org/officeDocument/2006/relationships" xmlns:mc="http://schemas.openxmlformats.org/markup-compatibility/2006" xmlns:mv="urn:schemas-microsoft-com:mac:vml" xmlns:p="http://schemas.openxmlformats.org/presentationml/2006/main" xmlns:c="http://schemas.openxmlformats.org/drawingml/2006/chart" xmlns:dgm="http://schemas.openxmlformats.org/drawingml/2006/diagram" xmlns:o="urn:schemas-microsoft-com:office:office" xmlns:v="urn:schemas-microsoft-com:vml" xmlns:pvml="urn:schemas-microsoft-com:office:powerpoint" xmlns:com="http://schemas.openxmlformats.org/drawingml/2006/compatibility" xmlns:p14="http://schemas.microsoft.com/office/powerpoint/2010/main" xmlns:p15="http://schemas.microsoft.com/office/powerpoint/2012/main" xmlns:ahyp="http://schemas.microsoft.com/office/drawing/2018/hyperlinkcolor">
   <p:cSld>
     <p:spTree>
       <p:nvGrpSpPr>
-        <p:cNvPr id="84" name="Shape 84"/>
+        <p:cNvPr id="78" name="Shape 78"/>
         <p:cNvGrpSpPr/>
         <p:nvPr/>
       </p:nvGrpSpPr>
@@ -7800,7 +7352,7 @@
       </p:grpSpPr>
       <p:sp>
         <p:nvSpPr>
-          <p:cNvPr id="85" name="Google Shape;85;p18"/>
+          <p:cNvPr id="79" name="Google Shape;79;p17"/>
           <p:cNvSpPr txBox="1"/>
           <p:nvPr>
             <p:ph type="title"/>
@@ -7848,7 +7400,7 @@
       </p:sp>
       <p:pic>
         <p:nvPicPr>
-          <p:cNvPr id="86" name="Google Shape;86;p18"/>
+          <p:cNvPr id="80" name="Google Shape;80;p17"/>
           <p:cNvPicPr preferRelativeResize="0"/>
           <p:nvPr/>
         </p:nvPicPr>
@@ -7876,7 +7428,7 @@
       </p:pic>
       <p:pic>
         <p:nvPicPr>
-          <p:cNvPr id="87" name="Google Shape;87;p18"/>
+          <p:cNvPr id="81" name="Google Shape;81;p17"/>
           <p:cNvPicPr preferRelativeResize="0"/>
           <p:nvPr/>
         </p:nvPicPr>
@@ -7904,7 +7456,7 @@
       </p:pic>
       <p:sp>
         <p:nvSpPr>
-          <p:cNvPr id="88" name="Google Shape;88;p18"/>
+          <p:cNvPr id="82" name="Google Shape;82;p17"/>
           <p:cNvSpPr txBox="1"/>
           <p:nvPr>
             <p:ph idx="1" type="body"/>
@@ -7946,6 +7498,462 @@
               <a:t>Data exploration of the primary features.</a:t>
             </a:r>
             <a:endParaRPr/>
+          </a:p>
+        </p:txBody>
+      </p:sp>
+    </p:spTree>
+  </p:cSld>
+  <p:clrMapOvr>
+    <a:masterClrMapping/>
+  </p:clrMapOvr>
+</p:sld>
+</file>
+
+<file path=ppt/slides/slide6.xml><?xml version="1.0" encoding="utf-8"?>
+<p:sld xmlns:a="http://schemas.openxmlformats.org/drawingml/2006/main" xmlns:r="http://schemas.openxmlformats.org/officeDocument/2006/relationships" xmlns:mc="http://schemas.openxmlformats.org/markup-compatibility/2006" xmlns:mv="urn:schemas-microsoft-com:mac:vml" xmlns:p="http://schemas.openxmlformats.org/presentationml/2006/main" xmlns:c="http://schemas.openxmlformats.org/drawingml/2006/chart" xmlns:dgm="http://schemas.openxmlformats.org/drawingml/2006/diagram" xmlns:o="urn:schemas-microsoft-com:office:office" xmlns:v="urn:schemas-microsoft-com:vml" xmlns:pvml="urn:schemas-microsoft-com:office:powerpoint" xmlns:com="http://schemas.openxmlformats.org/drawingml/2006/compatibility" xmlns:p14="http://schemas.microsoft.com/office/powerpoint/2010/main" xmlns:p15="http://schemas.microsoft.com/office/powerpoint/2012/main" xmlns:ahyp="http://schemas.microsoft.com/office/drawing/2018/hyperlinkcolor">
+  <p:cSld>
+    <p:spTree>
+      <p:nvGrpSpPr>
+        <p:cNvPr id="86" name="Shape 86"/>
+        <p:cNvGrpSpPr/>
+        <p:nvPr/>
+      </p:nvGrpSpPr>
+      <p:grpSpPr>
+        <a:xfrm>
+          <a:off x="0" y="0"/>
+          <a:ext cx="0" cy="0"/>
+          <a:chOff x="0" y="0"/>
+          <a:chExt cx="0" cy="0"/>
+        </a:xfrm>
+      </p:grpSpPr>
+      <p:sp>
+        <p:nvSpPr>
+          <p:cNvPr id="87" name="Google Shape;87;p18"/>
+          <p:cNvSpPr txBox="1"/>
+          <p:nvPr>
+            <p:ph type="title"/>
+          </p:nvPr>
+        </p:nvSpPr>
+        <p:spPr>
+          <a:xfrm>
+            <a:off x="311700" y="445025"/>
+            <a:ext cx="8520600" cy="572700"/>
+          </a:xfrm>
+          <a:prstGeom prst="rect">
+            <a:avLst/>
+          </a:prstGeom>
+        </p:spPr>
+        <p:txBody>
+          <a:bodyPr anchorCtr="0" anchor="t" bIns="91425" lIns="91425" spcFirstLastPara="1" rIns="91425" wrap="square" tIns="91425">
+            <a:normAutofit fontScale="90000"/>
+          </a:bodyPr>
+          <a:lstStyle/>
+          <a:p>
+            <a:pPr indent="0" lvl="0" marL="0" rtl="0" algn="l">
+              <a:spcBef>
+                <a:spcPts val="0"/>
+              </a:spcBef>
+              <a:spcAft>
+                <a:spcPts val="0"/>
+              </a:spcAft>
+              <a:buNone/>
+            </a:pPr>
+            <a:r>
+              <a:rPr lang="en">
+                <a:solidFill>
+                  <a:srgbClr val="FF0000"/>
+                </a:solidFill>
+              </a:rPr>
+              <a:t>Data Preprocessing and feature selection</a:t>
+            </a:r>
+            <a:endParaRPr>
+              <a:solidFill>
+                <a:srgbClr val="FF0000"/>
+              </a:solidFill>
+            </a:endParaRPr>
+          </a:p>
+        </p:txBody>
+      </p:sp>
+      <p:sp>
+        <p:nvSpPr>
+          <p:cNvPr id="88" name="Google Shape;88;p18"/>
+          <p:cNvSpPr txBox="1"/>
+          <p:nvPr>
+            <p:ph idx="1" type="body"/>
+          </p:nvPr>
+        </p:nvSpPr>
+        <p:spPr>
+          <a:xfrm>
+            <a:off x="311700" y="1152475"/>
+            <a:ext cx="8520600" cy="3591900"/>
+          </a:xfrm>
+          <a:prstGeom prst="rect">
+            <a:avLst/>
+          </a:prstGeom>
+        </p:spPr>
+        <p:txBody>
+          <a:bodyPr anchorCtr="0" anchor="t" bIns="91425" lIns="91425" spcFirstLastPara="1" rIns="91425" wrap="square" tIns="91425">
+            <a:noAutofit/>
+          </a:bodyPr>
+          <a:lstStyle/>
+          <a:p>
+            <a:pPr indent="-323850" lvl="0" marL="457200" rtl="0" algn="l">
+              <a:lnSpc>
+                <a:spcPct val="95000"/>
+              </a:lnSpc>
+              <a:spcBef>
+                <a:spcPts val="0"/>
+              </a:spcBef>
+              <a:spcAft>
+                <a:spcPts val="0"/>
+              </a:spcAft>
+              <a:buClr>
+                <a:srgbClr val="000000"/>
+              </a:buClr>
+              <a:buSzPts val="1500"/>
+              <a:buChar char="●"/>
+            </a:pPr>
+            <a:r>
+              <a:rPr lang="en" sz="1500">
+                <a:solidFill>
+                  <a:srgbClr val="000000"/>
+                </a:solidFill>
+              </a:rPr>
+              <a:t>The feature which has no </a:t>
+            </a:r>
+            <a:r>
+              <a:rPr lang="en" sz="1500">
+                <a:solidFill>
+                  <a:srgbClr val="000000"/>
+                </a:solidFill>
+              </a:rPr>
+              <a:t>relevant</a:t>
+            </a:r>
+            <a:r>
+              <a:rPr lang="en" sz="1500">
+                <a:solidFill>
+                  <a:srgbClr val="000000"/>
+                </a:solidFill>
+              </a:rPr>
+              <a:t> data is dropped.</a:t>
+            </a:r>
+            <a:endParaRPr sz="1500">
+              <a:solidFill>
+                <a:srgbClr val="000000"/>
+              </a:solidFill>
+            </a:endParaRPr>
+          </a:p>
+          <a:p>
+            <a:pPr indent="-323850" lvl="0" marL="457200" rtl="0" algn="l">
+              <a:lnSpc>
+                <a:spcPct val="95000"/>
+              </a:lnSpc>
+              <a:spcBef>
+                <a:spcPts val="0"/>
+              </a:spcBef>
+              <a:spcAft>
+                <a:spcPts val="0"/>
+              </a:spcAft>
+              <a:buClr>
+                <a:srgbClr val="000000"/>
+              </a:buClr>
+              <a:buSzPts val="1500"/>
+              <a:buChar char="●"/>
+            </a:pPr>
+            <a:r>
+              <a:rPr lang="en" sz="1500">
+                <a:solidFill>
+                  <a:srgbClr val="000000"/>
+                </a:solidFill>
+              </a:rPr>
+              <a:t>The target values are converted to 0 and 1.</a:t>
+            </a:r>
+            <a:endParaRPr sz="1500">
+              <a:solidFill>
+                <a:srgbClr val="000000"/>
+              </a:solidFill>
+            </a:endParaRPr>
+          </a:p>
+          <a:p>
+            <a:pPr indent="-323850" lvl="0" marL="457200" rtl="0" algn="l">
+              <a:lnSpc>
+                <a:spcPct val="95000"/>
+              </a:lnSpc>
+              <a:spcBef>
+                <a:spcPts val="0"/>
+              </a:spcBef>
+              <a:spcAft>
+                <a:spcPts val="0"/>
+              </a:spcAft>
+              <a:buClr>
+                <a:srgbClr val="000000"/>
+              </a:buClr>
+              <a:buSzPts val="1500"/>
+              <a:buChar char="●"/>
+            </a:pPr>
+            <a:r>
+              <a:rPr lang="en" sz="1500">
+                <a:solidFill>
+                  <a:srgbClr val="000000"/>
+                </a:solidFill>
+              </a:rPr>
+              <a:t>Dataframe is checked for null values.</a:t>
+            </a:r>
+            <a:endParaRPr sz="1500">
+              <a:solidFill>
+                <a:srgbClr val="000000"/>
+              </a:solidFill>
+            </a:endParaRPr>
+          </a:p>
+          <a:p>
+            <a:pPr indent="0" lvl="0" marL="0" rtl="0" algn="l">
+              <a:lnSpc>
+                <a:spcPct val="95000"/>
+              </a:lnSpc>
+              <a:spcBef>
+                <a:spcPts val="1200"/>
+              </a:spcBef>
+              <a:spcAft>
+                <a:spcPts val="0"/>
+              </a:spcAft>
+              <a:buNone/>
+            </a:pPr>
+            <a:r>
+              <a:rPr lang="en" sz="1500">
+                <a:solidFill>
+                  <a:srgbClr val="000000"/>
+                </a:solidFill>
+              </a:rPr>
+              <a:t>	Different </a:t>
+            </a:r>
+            <a:r>
+              <a:rPr lang="en" sz="1500">
+                <a:solidFill>
+                  <a:srgbClr val="000000"/>
+                </a:solidFill>
+              </a:rPr>
+              <a:t>options</a:t>
+            </a:r>
+            <a:r>
+              <a:rPr lang="en" sz="1500">
+                <a:solidFill>
+                  <a:srgbClr val="000000"/>
+                </a:solidFill>
+              </a:rPr>
+              <a:t> are tried in terms feature selection and data preprocessing like</a:t>
+            </a:r>
+            <a:endParaRPr sz="1500">
+              <a:solidFill>
+                <a:srgbClr val="000000"/>
+              </a:solidFill>
+            </a:endParaRPr>
+          </a:p>
+          <a:p>
+            <a:pPr indent="-323850" lvl="0" marL="457200" rtl="0" algn="l">
+              <a:lnSpc>
+                <a:spcPct val="95000"/>
+              </a:lnSpc>
+              <a:spcBef>
+                <a:spcPts val="1200"/>
+              </a:spcBef>
+              <a:spcAft>
+                <a:spcPts val="0"/>
+              </a:spcAft>
+              <a:buClr>
+                <a:srgbClr val="000000"/>
+              </a:buClr>
+              <a:buSzPts val="1500"/>
+              <a:buChar char="●"/>
+            </a:pPr>
+            <a:r>
+              <a:rPr lang="en" sz="1500">
+                <a:solidFill>
+                  <a:srgbClr val="000000"/>
+                </a:solidFill>
+              </a:rPr>
+              <a:t>Selecting</a:t>
+            </a:r>
+            <a:r>
+              <a:rPr lang="en" sz="1500">
+                <a:solidFill>
+                  <a:srgbClr val="000000"/>
+                </a:solidFill>
+              </a:rPr>
+              <a:t> K best features.</a:t>
+            </a:r>
+            <a:endParaRPr sz="1500">
+              <a:solidFill>
+                <a:srgbClr val="000000"/>
+              </a:solidFill>
+            </a:endParaRPr>
+          </a:p>
+          <a:p>
+            <a:pPr indent="-323850" lvl="0" marL="457200" rtl="0" algn="l">
+              <a:lnSpc>
+                <a:spcPct val="95000"/>
+              </a:lnSpc>
+              <a:spcBef>
+                <a:spcPts val="0"/>
+              </a:spcBef>
+              <a:spcAft>
+                <a:spcPts val="0"/>
+              </a:spcAft>
+              <a:buClr>
+                <a:srgbClr val="000000"/>
+              </a:buClr>
+              <a:buSzPts val="1500"/>
+              <a:buChar char="●"/>
+            </a:pPr>
+            <a:r>
+              <a:rPr lang="en" sz="1500">
+                <a:solidFill>
+                  <a:srgbClr val="000000"/>
+                </a:solidFill>
+              </a:rPr>
+              <a:t>PCA</a:t>
+            </a:r>
+            <a:endParaRPr sz="1500">
+              <a:solidFill>
+                <a:srgbClr val="000000"/>
+              </a:solidFill>
+            </a:endParaRPr>
+          </a:p>
+          <a:p>
+            <a:pPr indent="-323850" lvl="0" marL="457200" rtl="0" algn="l">
+              <a:lnSpc>
+                <a:spcPct val="95000"/>
+              </a:lnSpc>
+              <a:spcBef>
+                <a:spcPts val="0"/>
+              </a:spcBef>
+              <a:spcAft>
+                <a:spcPts val="0"/>
+              </a:spcAft>
+              <a:buClr>
+                <a:srgbClr val="000000"/>
+              </a:buClr>
+              <a:buSzPts val="1500"/>
+              <a:buChar char="●"/>
+            </a:pPr>
+            <a:r>
+              <a:rPr lang="en" sz="1500">
+                <a:solidFill>
+                  <a:srgbClr val="000000"/>
+                </a:solidFill>
+              </a:rPr>
+              <a:t>Selecting the top features based correlation to the target</a:t>
+            </a:r>
+            <a:endParaRPr sz="1500">
+              <a:solidFill>
+                <a:srgbClr val="000000"/>
+              </a:solidFill>
+            </a:endParaRPr>
+          </a:p>
+          <a:p>
+            <a:pPr indent="-323850" lvl="0" marL="457200" rtl="0" algn="l">
+              <a:lnSpc>
+                <a:spcPct val="95000"/>
+              </a:lnSpc>
+              <a:spcBef>
+                <a:spcPts val="0"/>
+              </a:spcBef>
+              <a:spcAft>
+                <a:spcPts val="0"/>
+              </a:spcAft>
+              <a:buClr>
+                <a:srgbClr val="000000"/>
+              </a:buClr>
+              <a:buSzPts val="1500"/>
+              <a:buChar char="●"/>
+            </a:pPr>
+            <a:r>
+              <a:rPr lang="en" sz="1500">
+                <a:solidFill>
+                  <a:srgbClr val="000000"/>
+                </a:solidFill>
+              </a:rPr>
+              <a:t>Removing the skewness using log function.</a:t>
+            </a:r>
+            <a:endParaRPr sz="1500">
+              <a:solidFill>
+                <a:srgbClr val="000000"/>
+              </a:solidFill>
+            </a:endParaRPr>
+          </a:p>
+          <a:p>
+            <a:pPr indent="0" lvl="0" marL="0" rtl="0" algn="l">
+              <a:lnSpc>
+                <a:spcPct val="95000"/>
+              </a:lnSpc>
+              <a:spcBef>
+                <a:spcPts val="1200"/>
+              </a:spcBef>
+              <a:spcAft>
+                <a:spcPts val="1200"/>
+              </a:spcAft>
+              <a:buNone/>
+            </a:pPr>
+            <a:r>
+              <a:rPr lang="en" sz="1500">
+                <a:solidFill>
+                  <a:srgbClr val="000000"/>
+                </a:solidFill>
+              </a:rPr>
+              <a:t>	The final model uses the </a:t>
+            </a:r>
+            <a:r>
+              <a:rPr lang="en" sz="1500">
+                <a:solidFill>
+                  <a:srgbClr val="000000"/>
+                </a:solidFill>
+              </a:rPr>
+              <a:t>features</a:t>
+            </a:r>
+            <a:r>
+              <a:rPr lang="en" sz="1500">
+                <a:solidFill>
+                  <a:srgbClr val="000000"/>
+                </a:solidFill>
+              </a:rPr>
+              <a:t> selected based on the </a:t>
+            </a:r>
+            <a:r>
+              <a:rPr lang="en" sz="1500">
+                <a:solidFill>
+                  <a:srgbClr val="000000"/>
+                </a:solidFill>
+              </a:rPr>
+              <a:t>correlation</a:t>
+            </a:r>
+            <a:r>
+              <a:rPr lang="en" sz="1500">
+                <a:solidFill>
+                  <a:srgbClr val="000000"/>
+                </a:solidFill>
+              </a:rPr>
+              <a:t> and the also the log function is used to remove skewness </a:t>
+            </a:r>
+            <a:r>
+              <a:rPr lang="en" sz="1500">
+                <a:solidFill>
+                  <a:srgbClr val="000000"/>
+                </a:solidFill>
+              </a:rPr>
+              <a:t>which</a:t>
+            </a:r>
+            <a:r>
+              <a:rPr lang="en" sz="1500">
+                <a:solidFill>
+                  <a:srgbClr val="000000"/>
+                </a:solidFill>
+              </a:rPr>
+              <a:t> improves the accuracy</a:t>
+            </a:r>
+            <a:endParaRPr sz="1500">
+              <a:solidFill>
+                <a:srgbClr val="000000"/>
+              </a:solidFill>
+            </a:endParaRPr>
           </a:p>
         </p:txBody>
       </p:sp>
@@ -8327,15 +8335,15 @@
         </p:nvSpPr>
         <p:spPr>
           <a:xfrm>
-            <a:off x="311700" y="445025"/>
-            <a:ext cx="8520600" cy="572700"/>
+            <a:off x="311700" y="555600"/>
+            <a:ext cx="2808000" cy="755700"/>
           </a:xfrm>
           <a:prstGeom prst="rect">
             <a:avLst/>
           </a:prstGeom>
         </p:spPr>
         <p:txBody>
-          <a:bodyPr anchorCtr="0" anchor="t" bIns="91425" lIns="91425" spcFirstLastPara="1" rIns="91425" wrap="square" tIns="91425">
+          <a:bodyPr anchorCtr="0" anchor="b" bIns="91425" lIns="91425" spcFirstLastPara="1" rIns="91425" wrap="square" tIns="91425">
             <a:normAutofit fontScale="90000"/>
           </a:bodyPr>
           <a:lstStyle/>
@@ -8375,8 +8383,8 @@
         </p:nvSpPr>
         <p:spPr>
           <a:xfrm>
-            <a:off x="311700" y="1152475"/>
-            <a:ext cx="8520600" cy="1365600"/>
+            <a:off x="311700" y="1389600"/>
+            <a:ext cx="2808000" cy="3179400"/>
           </a:xfrm>
           <a:prstGeom prst="rect">
             <a:avLst/>
@@ -8517,6 +8525,34 @@
           </a:p>
         </p:txBody>
       </p:sp>
+      <p:pic>
+        <p:nvPicPr>
+          <p:cNvPr id="101" name="Google Shape;101;p20"/>
+          <p:cNvPicPr preferRelativeResize="0"/>
+          <p:nvPr/>
+        </p:nvPicPr>
+        <p:blipFill>
+          <a:blip r:embed="rId3">
+            <a:alphaModFix/>
+          </a:blip>
+          <a:stretch>
+            <a:fillRect/>
+          </a:stretch>
+        </p:blipFill>
+        <p:spPr>
+          <a:xfrm>
+            <a:off x="3218525" y="1084650"/>
+            <a:ext cx="5719501" cy="3407125"/>
+          </a:xfrm>
+          <a:prstGeom prst="rect">
+            <a:avLst/>
+          </a:prstGeom>
+          <a:noFill/>
+          <a:ln>
+            <a:noFill/>
+          </a:ln>
+        </p:spPr>
+      </p:pic>
     </p:spTree>
   </p:cSld>
   <p:clrMapOvr>
@@ -8530,7 +8566,7 @@
   <p:cSld>
     <p:spTree>
       <p:nvGrpSpPr>
-        <p:cNvPr id="104" name="Shape 104"/>
+        <p:cNvPr id="105" name="Shape 105"/>
         <p:cNvGrpSpPr/>
         <p:nvPr/>
       </p:nvGrpSpPr>
@@ -8544,7 +8580,7 @@
       </p:grpSpPr>
       <p:sp>
         <p:nvSpPr>
-          <p:cNvPr id="105" name="Google Shape;105;p21"/>
+          <p:cNvPr id="106" name="Google Shape;106;p21"/>
           <p:cNvSpPr txBox="1"/>
           <p:nvPr>
             <p:ph type="title"/>

</xml_diff>